<commit_message>
updated project requirements and initialized feasibility analysis
</commit_message>
<xml_diff>
--- a/deliverables/project_overview.pptx
+++ b/deliverables/project_overview.pptx
@@ -3957,7 +3957,7 @@
           <a:p>
             <a:fld id="{6083C2AA-89AA-DF40-8BFB-8E8D91B9A26D}" type="datetimeFigureOut">
               <a:rPr lang="en-US" smtClean="0"/>
-              <a:t>5/3/23</a:t>
+              <a:t>5/16/23</a:t>
             </a:fld>
             <a:endParaRPr lang="en-US"/>
           </a:p>
@@ -6565,7 +6565,7 @@
           <a:p>
             <a:fld id="{9722764F-F819-594B-BA02-9CAF06EE9DE7}" type="datetimeFigureOut">
               <a:rPr lang="en-US" smtClean="0"/>
-              <a:t>5/3/23</a:t>
+              <a:t>5/16/23</a:t>
             </a:fld>
             <a:endParaRPr lang="en-US"/>
           </a:p>
@@ -6763,7 +6763,7 @@
           <a:p>
             <a:fld id="{9722764F-F819-594B-BA02-9CAF06EE9DE7}" type="datetimeFigureOut">
               <a:rPr lang="en-US" smtClean="0"/>
-              <a:t>5/3/23</a:t>
+              <a:t>5/16/23</a:t>
             </a:fld>
             <a:endParaRPr lang="en-US"/>
           </a:p>
@@ -6971,7 +6971,7 @@
           <a:p>
             <a:fld id="{9722764F-F819-594B-BA02-9CAF06EE9DE7}" type="datetimeFigureOut">
               <a:rPr lang="en-US" smtClean="0"/>
-              <a:t>5/3/23</a:t>
+              <a:t>5/16/23</a:t>
             </a:fld>
             <a:endParaRPr lang="en-US"/>
           </a:p>
@@ -7169,7 +7169,7 @@
           <a:p>
             <a:fld id="{9722764F-F819-594B-BA02-9CAF06EE9DE7}" type="datetimeFigureOut">
               <a:rPr lang="en-US" smtClean="0"/>
-              <a:t>5/3/23</a:t>
+              <a:t>5/16/23</a:t>
             </a:fld>
             <a:endParaRPr lang="en-US"/>
           </a:p>
@@ -7444,7 +7444,7 @@
           <a:p>
             <a:fld id="{9722764F-F819-594B-BA02-9CAF06EE9DE7}" type="datetimeFigureOut">
               <a:rPr lang="en-US" smtClean="0"/>
-              <a:t>5/3/23</a:t>
+              <a:t>5/16/23</a:t>
             </a:fld>
             <a:endParaRPr lang="en-US"/>
           </a:p>
@@ -7709,7 +7709,7 @@
           <a:p>
             <a:fld id="{9722764F-F819-594B-BA02-9CAF06EE9DE7}" type="datetimeFigureOut">
               <a:rPr lang="en-US" smtClean="0"/>
-              <a:t>5/3/23</a:t>
+              <a:t>5/16/23</a:t>
             </a:fld>
             <a:endParaRPr lang="en-US"/>
           </a:p>
@@ -8121,7 +8121,7 @@
           <a:p>
             <a:fld id="{9722764F-F819-594B-BA02-9CAF06EE9DE7}" type="datetimeFigureOut">
               <a:rPr lang="en-US" smtClean="0"/>
-              <a:t>5/3/23</a:t>
+              <a:t>5/16/23</a:t>
             </a:fld>
             <a:endParaRPr lang="en-US"/>
           </a:p>
@@ -8262,7 +8262,7 @@
           <a:p>
             <a:fld id="{9722764F-F819-594B-BA02-9CAF06EE9DE7}" type="datetimeFigureOut">
               <a:rPr lang="en-US" smtClean="0"/>
-              <a:t>5/3/23</a:t>
+              <a:t>5/16/23</a:t>
             </a:fld>
             <a:endParaRPr lang="en-US"/>
           </a:p>
@@ -8375,7 +8375,7 @@
           <a:p>
             <a:fld id="{9722764F-F819-594B-BA02-9CAF06EE9DE7}" type="datetimeFigureOut">
               <a:rPr lang="en-US" smtClean="0"/>
-              <a:t>5/3/23</a:t>
+              <a:t>5/16/23</a:t>
             </a:fld>
             <a:endParaRPr lang="en-US"/>
           </a:p>
@@ -8686,7 +8686,7 @@
           <a:p>
             <a:fld id="{9722764F-F819-594B-BA02-9CAF06EE9DE7}" type="datetimeFigureOut">
               <a:rPr lang="en-US" smtClean="0"/>
-              <a:t>5/3/23</a:t>
+              <a:t>5/16/23</a:t>
             </a:fld>
             <a:endParaRPr lang="en-US"/>
           </a:p>
@@ -8974,7 +8974,7 @@
           <a:p>
             <a:fld id="{9722764F-F819-594B-BA02-9CAF06EE9DE7}" type="datetimeFigureOut">
               <a:rPr lang="en-US" smtClean="0"/>
-              <a:t>5/3/23</a:t>
+              <a:t>5/16/23</a:t>
             </a:fld>
             <a:endParaRPr lang="en-US"/>
           </a:p>
@@ -9215,7 +9215,7 @@
           <a:p>
             <a:fld id="{9722764F-F819-594B-BA02-9CAF06EE9DE7}" type="datetimeFigureOut">
               <a:rPr lang="en-US" smtClean="0"/>
-              <a:t>5/3/23</a:t>
+              <a:t>5/16/23</a:t>
             </a:fld>
             <a:endParaRPr lang="en-US"/>
           </a:p>
@@ -9721,7 +9721,7 @@
         </p:blipFill>
         <p:spPr>
           <a:xfrm>
-            <a:off x="8528" y="10"/>
+            <a:off x="8528" y="9949"/>
             <a:ext cx="12191999" cy="6857990"/>
           </a:xfrm>
           <a:prstGeom prst="rect">
@@ -9929,11 +9929,11 @@
   <p:clrMapOvr>
     <a:masterClrMapping/>
   </p:clrMapOvr>
-  <mc:AlternateContent xmlns:mc="http://schemas.openxmlformats.org/markup-compatibility/2006">
-    <mc:Choice xmlns:p14="http://schemas.microsoft.com/office/powerpoint/2010/main" Requires="p14">
+  <mc:AlternateContent xmlns:mc="http://schemas.openxmlformats.org/markup-compatibility/2006" xmlns:p14="http://schemas.microsoft.com/office/powerpoint/2010/main">
+    <mc:Choice Requires="p14">
       <p:transition spd="slow" p14:dur="2000" advTm="4133"/>
     </mc:Choice>
-    <mc:Fallback>
+    <mc:Fallback xmlns="">
       <p:transition spd="slow" advTm="4133"/>
     </mc:Fallback>
   </mc:AlternateContent>
@@ -13185,7 +13185,7 @@
         </p:blipFill>
         <p:spPr>
           <a:xfrm>
-            <a:off x="-95272" y="0"/>
+            <a:off x="-95272" y="44970"/>
             <a:ext cx="12287272" cy="6858000"/>
           </a:xfrm>
           <a:prstGeom prst="rect">

</xml_diff>